<commit_message>
added soc med bibs
</commit_message>
<xml_diff>
--- a/slides/Economic_factors/Economic_factors.pptx
+++ b/slides/Economic_factors/Economic_factors.pptx
@@ -8,11 +8,16 @@
     <p:sldId id="256" r:id="rId2"/>
     <p:sldId id="257" r:id="rId3"/>
     <p:sldId id="258" r:id="rId4"/>
-    <p:sldId id="259" r:id="rId5"/>
-    <p:sldId id="260" r:id="rId6"/>
-    <p:sldId id="261" r:id="rId7"/>
-    <p:sldId id="262" r:id="rId8"/>
-    <p:sldId id="263" r:id="rId9"/>
+    <p:sldId id="265" r:id="rId5"/>
+    <p:sldId id="264" r:id="rId6"/>
+    <p:sldId id="259" r:id="rId7"/>
+    <p:sldId id="260" r:id="rId8"/>
+    <p:sldId id="266" r:id="rId9"/>
+    <p:sldId id="267" r:id="rId10"/>
+    <p:sldId id="261" r:id="rId11"/>
+    <p:sldId id="262" r:id="rId12"/>
+    <p:sldId id="263" r:id="rId13"/>
+    <p:sldId id="268" r:id="rId14"/>
   </p:sldIdLst>
   <p:sldSz cx="9144000" cy="6858000" type="screen4x3"/>
   <p:notesSz cx="6858000" cy="9144000"/>
@@ -295,7 +300,7 @@
           <a:p>
             <a:fld id="{F8166F1F-CE9B-4651-A6AA-CD717754106B}" type="datetimeFigureOut">
               <a:rPr lang="en-US" smtClean="0"/>
-              <a:t>04/12/2014</a:t>
+              <a:t>02/12/15</a:t>
             </a:fld>
             <a:endParaRPr lang="en-US"/>
           </a:p>
@@ -503,7 +508,7 @@
           <a:p>
             <a:fld id="{F8166F1F-CE9B-4651-A6AA-CD717754106B}" type="datetimeFigureOut">
               <a:rPr lang="en-US" smtClean="0"/>
-              <a:t>04/12/2014</a:t>
+              <a:t>02/12/15</a:t>
             </a:fld>
             <a:endParaRPr lang="en-US"/>
           </a:p>
@@ -943,6 +948,303 @@
 </p:sld>
 </file>
 
+<file path=ppt/slides/slide10.xml><?xml version="1.0" encoding="utf-8"?>
+<p:sld xmlns:a="http://schemas.openxmlformats.org/drawingml/2006/main" xmlns:r="http://schemas.openxmlformats.org/officeDocument/2006/relationships" xmlns:p="http://schemas.openxmlformats.org/presentationml/2006/main">
+  <p:cSld>
+    <p:spTree>
+      <p:nvGrpSpPr>
+        <p:cNvPr id="1" name=""/>
+        <p:cNvGrpSpPr/>
+        <p:nvPr/>
+      </p:nvGrpSpPr>
+      <p:grpSpPr>
+        <a:xfrm>
+          <a:off x="0" y="0"/>
+          <a:ext cx="0" cy="0"/>
+          <a:chOff x="0" y="0"/>
+          <a:chExt cx="0" cy="0"/>
+        </a:xfrm>
+      </p:grpSpPr>
+      <p:pic>
+        <p:nvPicPr>
+          <p:cNvPr id="2" name="Object 1"/>
+          <p:cNvPicPr>
+            <a:picLocks noChangeAspect="1"/>
+          </p:cNvPicPr>
+          <p:nvPr/>
+        </p:nvPicPr>
+        <p:blipFill>
+          <a:blip r:embed="rId2" cstate="print"/>
+          <a:stretch>
+            <a:fillRect/>
+          </a:stretch>
+        </p:blipFill>
+        <p:spPr>
+          <a:xfrm>
+            <a:off x="0" y="0"/>
+            <a:ext cx="9144000" cy="6858000"/>
+          </a:xfrm>
+          <a:prstGeom prst="rect">
+            <a:avLst/>
+          </a:prstGeom>
+        </p:spPr>
+      </p:pic>
+    </p:spTree>
+  </p:cSld>
+  <p:clrMapOvr>
+    <a:masterClrMapping/>
+  </p:clrMapOvr>
+</p:sld>
+</file>
+
+<file path=ppt/slides/slide11.xml><?xml version="1.0" encoding="utf-8"?>
+<p:sld xmlns:a="http://schemas.openxmlformats.org/drawingml/2006/main" xmlns:r="http://schemas.openxmlformats.org/officeDocument/2006/relationships" xmlns:p="http://schemas.openxmlformats.org/presentationml/2006/main">
+  <p:cSld>
+    <p:spTree>
+      <p:nvGrpSpPr>
+        <p:cNvPr id="1" name=""/>
+        <p:cNvGrpSpPr/>
+        <p:nvPr/>
+      </p:nvGrpSpPr>
+      <p:grpSpPr>
+        <a:xfrm>
+          <a:off x="0" y="0"/>
+          <a:ext cx="0" cy="0"/>
+          <a:chOff x="0" y="0"/>
+          <a:chExt cx="0" cy="0"/>
+        </a:xfrm>
+      </p:grpSpPr>
+      <p:pic>
+        <p:nvPicPr>
+          <p:cNvPr id="2" name="Object 1"/>
+          <p:cNvPicPr>
+            <a:picLocks noChangeAspect="1"/>
+          </p:cNvPicPr>
+          <p:nvPr/>
+        </p:nvPicPr>
+        <p:blipFill>
+          <a:blip r:embed="rId2" cstate="print"/>
+          <a:stretch>
+            <a:fillRect/>
+          </a:stretch>
+        </p:blipFill>
+        <p:spPr>
+          <a:xfrm>
+            <a:off x="0" y="0"/>
+            <a:ext cx="9144000" cy="6858000"/>
+          </a:xfrm>
+          <a:prstGeom prst="rect">
+            <a:avLst/>
+          </a:prstGeom>
+        </p:spPr>
+      </p:pic>
+      <p:sp>
+        <p:nvSpPr>
+          <p:cNvPr id="3" name="Object 2"/>
+          <p:cNvSpPr txBox="1"/>
+          <p:nvPr/>
+        </p:nvSpPr>
+        <p:spPr>
+          <a:xfrm>
+            <a:off x="274320" y="6652260"/>
+            <a:ext cx="8686800" cy="369332"/>
+          </a:xfrm>
+          <a:prstGeom prst="rect">
+            <a:avLst/>
+          </a:prstGeom>
+          <a:noFill/>
+        </p:spPr>
+        <p:txBody>
+          <a:bodyPr wrap="square" rtlCol="0"/>
+          <a:lstStyle/>
+          <a:p>
+            <a:r>
+              <a:rPr lang="en-US" sz="800" dirty="0" smtClean="0">
+                <a:solidFill>
+                  <a:srgbClr val="FFFFFF"/>
+                </a:solidFill>
+                <a:latin typeface="Arial" pitchFamily="34" charset="0"/>
+                <a:cs typeface="Arial" pitchFamily="34" charset="0"/>
+              </a:rPr>
+              <a:t>Photo by heanster - Creative Commons Attribution-NonCommercial-ShareAlike License  https://www.flickr.com/photos/24582142@N00</a:t>
+            </a:r>
+            <a:endParaRPr lang="en-US" sz="800" dirty="0"/>
+          </a:p>
+        </p:txBody>
+      </p:sp>
+      <p:sp>
+        <p:nvSpPr>
+          <p:cNvPr id="4" name="Object 3"/>
+          <p:cNvSpPr txBox="1"/>
+          <p:nvPr/>
+        </p:nvSpPr>
+        <p:spPr>
+          <a:xfrm>
+            <a:off x="7589520" y="6652260"/>
+            <a:ext cx="2819400" cy="369332"/>
+          </a:xfrm>
+          <a:prstGeom prst="rect">
+            <a:avLst/>
+          </a:prstGeom>
+          <a:noFill/>
+        </p:spPr>
+        <p:txBody>
+          <a:bodyPr wrap="square" rtlCol="0"/>
+          <a:lstStyle/>
+          <a:p>
+            <a:endParaRPr lang="en-US" sz="800" dirty="0"/>
+          </a:p>
+        </p:txBody>
+      </p:sp>
+      <p:pic>
+        <p:nvPicPr>
+          <p:cNvPr id="5" name="Object 4"/>
+          <p:cNvPicPr>
+            <a:picLocks noChangeAspect="1"/>
+          </p:cNvPicPr>
+          <p:nvPr/>
+        </p:nvPicPr>
+        <p:blipFill>
+          <a:blip r:embed="rId3" cstate="print"/>
+          <a:stretch>
+            <a:fillRect/>
+          </a:stretch>
+        </p:blipFill>
+        <p:spPr>
+          <a:xfrm>
+            <a:off x="91440" y="6652260"/>
+            <a:ext cx="200000" cy="200000"/>
+          </a:xfrm>
+          <a:prstGeom prst="rect">
+            <a:avLst/>
+          </a:prstGeom>
+        </p:spPr>
+      </p:pic>
+    </p:spTree>
+  </p:cSld>
+  <p:clrMapOvr>
+    <a:masterClrMapping/>
+  </p:clrMapOvr>
+</p:sld>
+</file>
+
+<file path=ppt/slides/slide12.xml><?xml version="1.0" encoding="utf-8"?>
+<p:sld xmlns:a="http://schemas.openxmlformats.org/drawingml/2006/main" xmlns:r="http://schemas.openxmlformats.org/officeDocument/2006/relationships" xmlns:p="http://schemas.openxmlformats.org/presentationml/2006/main">
+  <p:cSld>
+    <p:spTree>
+      <p:nvGrpSpPr>
+        <p:cNvPr id="1" name=""/>
+        <p:cNvGrpSpPr/>
+        <p:nvPr/>
+      </p:nvGrpSpPr>
+      <p:grpSpPr>
+        <a:xfrm>
+          <a:off x="0" y="0"/>
+          <a:ext cx="0" cy="0"/>
+          <a:chOff x="0" y="0"/>
+          <a:chExt cx="0" cy="0"/>
+        </a:xfrm>
+      </p:grpSpPr>
+      <p:pic>
+        <p:nvPicPr>
+          <p:cNvPr id="2" name="Object 1"/>
+          <p:cNvPicPr>
+            <a:picLocks noChangeAspect="1"/>
+          </p:cNvPicPr>
+          <p:nvPr/>
+        </p:nvPicPr>
+        <p:blipFill>
+          <a:blip r:embed="rId2" cstate="print"/>
+          <a:stretch>
+            <a:fillRect/>
+          </a:stretch>
+        </p:blipFill>
+        <p:spPr>
+          <a:xfrm>
+            <a:off x="0" y="0"/>
+            <a:ext cx="9144000" cy="6858000"/>
+          </a:xfrm>
+          <a:prstGeom prst="rect">
+            <a:avLst/>
+          </a:prstGeom>
+        </p:spPr>
+      </p:pic>
+    </p:spTree>
+  </p:cSld>
+  <p:clrMapOvr>
+    <a:masterClrMapping/>
+  </p:clrMapOvr>
+</p:sld>
+</file>
+
+<file path=ppt/slides/slide13.xml><?xml version="1.0" encoding="utf-8"?>
+<p:sld xmlns:a="http://schemas.openxmlformats.org/drawingml/2006/main" xmlns:r="http://schemas.openxmlformats.org/officeDocument/2006/relationships" xmlns:p="http://schemas.openxmlformats.org/presentationml/2006/main">
+  <p:cSld>
+    <p:spTree>
+      <p:nvGrpSpPr>
+        <p:cNvPr id="1" name=""/>
+        <p:cNvGrpSpPr/>
+        <p:nvPr/>
+      </p:nvGrpSpPr>
+      <p:grpSpPr>
+        <a:xfrm>
+          <a:off x="0" y="0"/>
+          <a:ext cx="0" cy="0"/>
+          <a:chOff x="0" y="0"/>
+          <a:chExt cx="0" cy="0"/>
+        </a:xfrm>
+      </p:grpSpPr>
+      <p:sp>
+        <p:nvSpPr>
+          <p:cNvPr id="2" name="Title 1"/>
+          <p:cNvSpPr>
+            <a:spLocks noGrp="1"/>
+          </p:cNvSpPr>
+          <p:nvPr>
+            <p:ph type="ctrTitle"/>
+          </p:nvPr>
+        </p:nvSpPr>
+        <p:spPr/>
+        <p:txBody>
+          <a:bodyPr/>
+          <a:lstStyle/>
+          <a:p>
+            <a:endParaRPr lang="en-US"/>
+          </a:p>
+        </p:txBody>
+      </p:sp>
+      <p:sp>
+        <p:nvSpPr>
+          <p:cNvPr id="3" name="Subtitle 2"/>
+          <p:cNvSpPr>
+            <a:spLocks noGrp="1"/>
+          </p:cNvSpPr>
+          <p:nvPr>
+            <p:ph type="subTitle" idx="1"/>
+          </p:nvPr>
+        </p:nvSpPr>
+        <p:spPr/>
+        <p:txBody>
+          <a:bodyPr/>
+          <a:lstStyle/>
+          <a:p>
+            <a:endParaRPr lang="en-US"/>
+          </a:p>
+        </p:txBody>
+      </p:sp>
+    </p:spTree>
+    <p:extLst>
+      <p:ext uri="{BB962C8B-B14F-4D97-AF65-F5344CB8AC3E}">
+        <p14:creationId xmlns:p14="http://schemas.microsoft.com/office/powerpoint/2010/main" val="627704043"/>
+      </p:ext>
+    </p:extLst>
+  </p:cSld>
+  <p:clrMapOvr>
+    <a:masterClrMapping/>
+  </p:clrMapOvr>
+</p:sld>
+</file>
+
 <file path=ppt/slides/slide2.xml><?xml version="1.0" encoding="utf-8"?>
 <p:sld xmlns:a="http://schemas.openxmlformats.org/drawingml/2006/main" xmlns:r="http://schemas.openxmlformats.org/officeDocument/2006/relationships" xmlns:p="http://schemas.openxmlformats.org/presentationml/2006/main">
   <p:cSld>
@@ -1208,31 +1510,75 @@
           <a:chExt cx="0" cy="0"/>
         </a:xfrm>
       </p:grpSpPr>
-      <p:pic>
-        <p:nvPicPr>
-          <p:cNvPr id="2" name="Object 1"/>
-          <p:cNvPicPr>
-            <a:picLocks noChangeAspect="1"/>
-          </p:cNvPicPr>
-          <p:nvPr/>
-        </p:nvPicPr>
-        <p:blipFill>
-          <a:blip r:embed="rId2" cstate="print"/>
-          <a:stretch>
-            <a:fillRect/>
-          </a:stretch>
-        </p:blipFill>
-        <p:spPr>
-          <a:xfrm>
-            <a:off x="0" y="0"/>
-            <a:ext cx="9144000" cy="6858000"/>
-          </a:xfrm>
-          <a:prstGeom prst="rect">
-            <a:avLst/>
-          </a:prstGeom>
-        </p:spPr>
-      </p:pic>
+      <p:sp>
+        <p:nvSpPr>
+          <p:cNvPr id="2" name="Title 1"/>
+          <p:cNvSpPr>
+            <a:spLocks noGrp="1"/>
+          </p:cNvSpPr>
+          <p:nvPr>
+            <p:ph type="ctrTitle"/>
+          </p:nvPr>
+        </p:nvSpPr>
+        <p:spPr/>
+        <p:txBody>
+          <a:bodyPr>
+            <a:noAutofit/>
+          </a:bodyPr>
+          <a:lstStyle/>
+          <a:p>
+            <a:r>
+              <a:rPr lang="is-IS" sz="2400" dirty="0" smtClean="0"/>
+              <a:t>“…</a:t>
+            </a:r>
+            <a:r>
+              <a:rPr lang="en-US" sz="2400" dirty="0" smtClean="0"/>
+              <a:t>the </a:t>
+            </a:r>
+            <a:r>
+              <a:rPr lang="en-US" sz="2400" dirty="0"/>
+              <a:t>greater inequality in the economy implies lower income of the median voter, which leads to a higher popular demand for redistribution. This, in turn, increases incentives for those with high-income to affect the preferences for taxation and public good provision of those with low-income</a:t>
+            </a:r>
+            <a:r>
+              <a:rPr lang="en-US" sz="2400" dirty="0" smtClean="0"/>
+              <a:t>.” (pp. 205)</a:t>
+            </a:r>
+            <a:r>
+              <a:rPr lang="en-US" sz="2400" dirty="0"/>
+              <a:t/>
+            </a:r>
+            <a:br>
+              <a:rPr lang="en-US" sz="2400" dirty="0"/>
+            </a:br>
+            <a:endParaRPr lang="en-US" sz="2400" dirty="0"/>
+          </a:p>
+        </p:txBody>
+      </p:sp>
+      <p:sp>
+        <p:nvSpPr>
+          <p:cNvPr id="3" name="Subtitle 2"/>
+          <p:cNvSpPr>
+            <a:spLocks noGrp="1"/>
+          </p:cNvSpPr>
+          <p:nvPr>
+            <p:ph type="subTitle" idx="1"/>
+          </p:nvPr>
+        </p:nvSpPr>
+        <p:spPr/>
+        <p:txBody>
+          <a:bodyPr/>
+          <a:lstStyle/>
+          <a:p>
+            <a:endParaRPr lang="en-US"/>
+          </a:p>
+        </p:txBody>
+      </p:sp>
     </p:spTree>
+    <p:extLst>
+      <p:ext uri="{BB962C8B-B14F-4D97-AF65-F5344CB8AC3E}">
+        <p14:creationId xmlns:p14="http://schemas.microsoft.com/office/powerpoint/2010/main" val="1946265807"/>
+      </p:ext>
+    </p:extLst>
   </p:cSld>
   <p:clrMapOvr>
     <a:masterClrMapping/>
@@ -1257,113 +1603,198 @@
           <a:chExt cx="0" cy="0"/>
         </a:xfrm>
       </p:grpSpPr>
-      <p:pic>
-        <p:nvPicPr>
-          <p:cNvPr id="2" name="Object 1"/>
-          <p:cNvPicPr>
-            <a:picLocks noChangeAspect="1"/>
-          </p:cNvPicPr>
-          <p:nvPr/>
-        </p:nvPicPr>
-        <p:blipFill>
-          <a:blip r:embed="rId2" cstate="print"/>
-          <a:stretch>
-            <a:fillRect/>
-          </a:stretch>
-        </p:blipFill>
-        <p:spPr>
-          <a:xfrm>
-            <a:off x="0" y="0"/>
-            <a:ext cx="9144000" cy="6858000"/>
-          </a:xfrm>
-          <a:prstGeom prst="rect">
-            <a:avLst/>
-          </a:prstGeom>
-        </p:spPr>
-      </p:pic>
-      <p:sp>
-        <p:nvSpPr>
-          <p:cNvPr id="3" name="Object 2"/>
-          <p:cNvSpPr txBox="1"/>
-          <p:nvPr/>
-        </p:nvSpPr>
-        <p:spPr>
-          <a:xfrm>
-            <a:off x="274320" y="6652260"/>
-            <a:ext cx="8686800" cy="369332"/>
-          </a:xfrm>
-          <a:prstGeom prst="rect">
-            <a:avLst/>
-          </a:prstGeom>
-          <a:noFill/>
-        </p:spPr>
-        <p:txBody>
-          <a:bodyPr wrap="square" rtlCol="0"/>
+      <p:sp>
+        <p:nvSpPr>
+          <p:cNvPr id="2" name="Title 1"/>
+          <p:cNvSpPr>
+            <a:spLocks noGrp="1"/>
+          </p:cNvSpPr>
+          <p:nvPr>
+            <p:ph type="ctrTitle"/>
+          </p:nvPr>
+        </p:nvSpPr>
+        <p:spPr>
+          <a:xfrm>
+            <a:off x="593618" y="358637"/>
+            <a:ext cx="7772400" cy="1470025"/>
+          </a:xfrm>
+        </p:spPr>
+        <p:txBody>
+          <a:bodyPr/>
           <a:lstStyle/>
           <a:p>
             <a:r>
-              <a:rPr lang="en-US" sz="800" dirty="0" smtClean="0">
-                <a:solidFill>
-                  <a:srgbClr val="FFFFFF"/>
-                </a:solidFill>
-                <a:latin typeface="Arial" pitchFamily="34" charset="0"/>
-                <a:cs typeface="Arial" pitchFamily="34" charset="0"/>
+              <a:rPr lang="en-US" dirty="0" smtClean="0"/>
+              <a:t>Example: the Estate Tax in the US</a:t>
+            </a:r>
+            <a:endParaRPr lang="en-US" dirty="0"/>
+          </a:p>
+        </p:txBody>
+      </p:sp>
+      <p:sp>
+        <p:nvSpPr>
+          <p:cNvPr id="3" name="Subtitle 2"/>
+          <p:cNvSpPr>
+            <a:spLocks noGrp="1"/>
+          </p:cNvSpPr>
+          <p:nvPr>
+            <p:ph type="subTitle" idx="1"/>
+          </p:nvPr>
+        </p:nvSpPr>
+        <p:spPr>
+          <a:xfrm>
+            <a:off x="716976" y="1828662"/>
+            <a:ext cx="7569214" cy="1752600"/>
+          </a:xfrm>
+        </p:spPr>
+        <p:txBody>
+          <a:bodyPr>
+            <a:normAutofit fontScale="25000" lnSpcReduction="20000"/>
+          </a:bodyPr>
+          <a:lstStyle/>
+          <a:p>
+            <a:pPr marL="457200" indent="-457200" algn="l">
+              <a:buFont typeface="Arial"/>
+              <a:buChar char="•"/>
+            </a:pPr>
+            <a:r>
+              <a:rPr lang="en-US" sz="9600" dirty="0" smtClean="0">
+                <a:solidFill>
+                  <a:schemeClr val="tx1"/>
+                </a:solidFill>
               </a:rPr>
-              <a:t>Photo by Steven Andrew Photography - Creative Commons Attribution-NonCommercial License  https://www.flickr.com/photos/51555844@N07</a:t>
-            </a:r>
-            <a:endParaRPr lang="en-US" sz="800" dirty="0"/>
-          </a:p>
-        </p:txBody>
-      </p:sp>
-      <p:sp>
-        <p:nvSpPr>
-          <p:cNvPr id="4" name="Object 3"/>
-          <p:cNvSpPr txBox="1"/>
-          <p:nvPr/>
-        </p:nvSpPr>
-        <p:spPr>
-          <a:xfrm>
-            <a:off x="7589520" y="6652260"/>
-            <a:ext cx="2819400" cy="369332"/>
-          </a:xfrm>
-          <a:prstGeom prst="rect">
-            <a:avLst/>
-          </a:prstGeom>
-          <a:noFill/>
-        </p:spPr>
-        <p:txBody>
-          <a:bodyPr wrap="square" rtlCol="0"/>
-          <a:lstStyle/>
-          <a:p>
-            <a:endParaRPr lang="en-US" sz="800" dirty="0"/>
-          </a:p>
-        </p:txBody>
-      </p:sp>
-      <p:pic>
-        <p:nvPicPr>
-          <p:cNvPr id="5" name="Object 4"/>
-          <p:cNvPicPr>
-            <a:picLocks noChangeAspect="1"/>
-          </p:cNvPicPr>
-          <p:nvPr/>
-        </p:nvPicPr>
-        <p:blipFill>
-          <a:blip r:embed="rId3" cstate="print"/>
-          <a:stretch>
-            <a:fillRect/>
-          </a:stretch>
-        </p:blipFill>
-        <p:spPr>
-          <a:xfrm>
-            <a:off x="91440" y="6652260"/>
-            <a:ext cx="200000" cy="200000"/>
-          </a:xfrm>
-          <a:prstGeom prst="rect">
-            <a:avLst/>
-          </a:prstGeom>
-        </p:spPr>
-      </p:pic>
+              <a:t>A highly progressive tax with top rate of 55%, only paid by richest 1-2%</a:t>
+            </a:r>
+          </a:p>
+          <a:p>
+            <a:pPr marL="457200" indent="-457200" algn="l">
+              <a:buFont typeface="Arial"/>
+              <a:buChar char="•"/>
+            </a:pPr>
+            <a:r>
+              <a:rPr lang="en-US" sz="9600" dirty="0" smtClean="0">
+                <a:solidFill>
+                  <a:schemeClr val="tx1"/>
+                </a:solidFill>
+              </a:rPr>
+              <a:t>In the 1990s, wealthy Americans started a campaign to abolish this tax</a:t>
+            </a:r>
+          </a:p>
+          <a:p>
+            <a:pPr marL="914400" lvl="1" indent="-457200" algn="l">
+              <a:buFont typeface="Arial"/>
+              <a:buChar char="•"/>
+            </a:pPr>
+            <a:r>
+              <a:rPr lang="en-US" sz="9600" dirty="0" smtClean="0">
+                <a:solidFill>
+                  <a:schemeClr val="tx1"/>
+                </a:solidFill>
+              </a:rPr>
+              <a:t>Since 1998, 18 wealthy families spend $490.3 million on lobbying, mostly information campaigns in media</a:t>
+            </a:r>
+          </a:p>
+          <a:p>
+            <a:pPr marL="914400" lvl="1" indent="-457200" algn="l">
+              <a:buFont typeface="Arial"/>
+              <a:buChar char="•"/>
+            </a:pPr>
+            <a:r>
+              <a:rPr lang="en-US" sz="9600" dirty="0" smtClean="0">
+                <a:solidFill>
+                  <a:schemeClr val="tx1"/>
+                </a:solidFill>
+              </a:rPr>
+              <a:t>Anti-tax adverts popularized the phrase “death tax”</a:t>
+            </a:r>
+          </a:p>
+          <a:p>
+            <a:pPr marL="914400" lvl="1" indent="-457200" algn="l">
+              <a:buFont typeface="Arial"/>
+              <a:buChar char="•"/>
+            </a:pPr>
+            <a:r>
+              <a:rPr lang="en-US" sz="9600" dirty="0" smtClean="0">
+                <a:solidFill>
+                  <a:schemeClr val="tx1"/>
+                </a:solidFill>
+              </a:rPr>
+              <a:t>Frank </a:t>
+            </a:r>
+            <a:r>
+              <a:rPr lang="en-US" sz="9600" dirty="0" err="1" smtClean="0">
+                <a:solidFill>
+                  <a:schemeClr val="tx1"/>
+                </a:solidFill>
+              </a:rPr>
+              <a:t>Blethen</a:t>
+            </a:r>
+            <a:r>
+              <a:rPr lang="en-US" sz="9600" dirty="0" smtClean="0">
+                <a:solidFill>
+                  <a:schemeClr val="tx1"/>
+                </a:solidFill>
+              </a:rPr>
+              <a:t>, controlling owner of The Seattle Times, steered the paper against it</a:t>
+            </a:r>
+          </a:p>
+          <a:p>
+            <a:pPr marL="914400" lvl="1" indent="-457200" algn="l">
+              <a:buFont typeface="Arial"/>
+              <a:buChar char="•"/>
+            </a:pPr>
+            <a:r>
+              <a:rPr lang="en-US" sz="9600" dirty="0" smtClean="0">
+                <a:solidFill>
+                  <a:schemeClr val="tx1"/>
+                </a:solidFill>
+              </a:rPr>
+              <a:t>Robert Johnson of BET paid for anti-estate tax ads in Washington Post, USA Today, and others</a:t>
+            </a:r>
+          </a:p>
+          <a:p>
+            <a:pPr marL="457200" indent="-457200" algn="l">
+              <a:buFont typeface="Arial"/>
+              <a:buChar char="•"/>
+            </a:pPr>
+            <a:r>
+              <a:rPr lang="en-US" sz="9600" dirty="0" smtClean="0">
+                <a:solidFill>
+                  <a:schemeClr val="tx1"/>
+                </a:solidFill>
+              </a:rPr>
+              <a:t>In 2001, Congress voted to repeal the estate tax</a:t>
+            </a:r>
+            <a:endParaRPr lang="en-US" sz="9600" dirty="0">
+              <a:solidFill>
+                <a:schemeClr val="tx1"/>
+              </a:solidFill>
+            </a:endParaRPr>
+          </a:p>
+          <a:p>
+            <a:pPr marL="457200" indent="-457200" algn="l">
+              <a:buFont typeface="Arial"/>
+              <a:buChar char="•"/>
+            </a:pPr>
+            <a:endParaRPr lang="en-US" dirty="0" smtClean="0"/>
+          </a:p>
+          <a:p>
+            <a:r>
+              <a:rPr lang="en-US" dirty="0" smtClean="0"/>
+              <a:t>O</a:t>
+            </a:r>
+          </a:p>
+          <a:p>
+            <a:endParaRPr lang="en-US" dirty="0"/>
+          </a:p>
+        </p:txBody>
+      </p:sp>
     </p:spTree>
+    <p:extLst>
+      <p:ext uri="{BB962C8B-B14F-4D97-AF65-F5344CB8AC3E}">
+        <p14:creationId xmlns:p14="http://schemas.microsoft.com/office/powerpoint/2010/main" val="2637037104"/>
+      </p:ext>
+    </p:extLst>
   </p:cSld>
   <p:clrMapOvr>
     <a:masterClrMapping/>
@@ -1489,7 +1920,7 @@
                 <a:latin typeface="Arial" pitchFamily="34" charset="0"/>
                 <a:cs typeface="Arial" pitchFamily="34" charset="0"/>
               </a:rPr>
-              <a:t>Photo by heanster - Creative Commons Attribution-NonCommercial-ShareAlike License  https://www.flickr.com/photos/24582142@N00</a:t>
+              <a:t>Photo by Steven Andrew Photography - Creative Commons Attribution-NonCommercial License  https://www.flickr.com/photos/51555844@N07</a:t>
             </a:r>
             <a:endParaRPr lang="en-US" sz="800" dirty="0"/>
           </a:p>
@@ -1568,31 +1999,291 @@
           <a:chExt cx="0" cy="0"/>
         </a:xfrm>
       </p:grpSpPr>
-      <p:pic>
-        <p:nvPicPr>
-          <p:cNvPr id="2" name="Object 1"/>
-          <p:cNvPicPr>
-            <a:picLocks noChangeAspect="1"/>
-          </p:cNvPicPr>
-          <p:nvPr/>
-        </p:nvPicPr>
-        <p:blipFill>
-          <a:blip r:embed="rId2" cstate="print"/>
-          <a:stretch>
-            <a:fillRect/>
-          </a:stretch>
-        </p:blipFill>
-        <p:spPr>
-          <a:xfrm>
-            <a:off x="0" y="0"/>
-            <a:ext cx="9144000" cy="6858000"/>
-          </a:xfrm>
-          <a:prstGeom prst="rect">
-            <a:avLst/>
-          </a:prstGeom>
-        </p:spPr>
-      </p:pic>
+      <p:sp>
+        <p:nvSpPr>
+          <p:cNvPr id="2" name="Title 1"/>
+          <p:cNvSpPr>
+            <a:spLocks noGrp="1"/>
+          </p:cNvSpPr>
+          <p:nvPr>
+            <p:ph type="ctrTitle"/>
+          </p:nvPr>
+        </p:nvSpPr>
+        <p:spPr/>
+        <p:txBody>
+          <a:bodyPr/>
+          <a:lstStyle/>
+          <a:p>
+            <a:endParaRPr lang="en-US" dirty="0"/>
+          </a:p>
+        </p:txBody>
+      </p:sp>
+      <p:sp>
+        <p:nvSpPr>
+          <p:cNvPr id="3" name="Subtitle 2"/>
+          <p:cNvSpPr>
+            <a:spLocks noGrp="1"/>
+          </p:cNvSpPr>
+          <p:nvPr>
+            <p:ph type="subTitle" idx="1"/>
+          </p:nvPr>
+        </p:nvSpPr>
+        <p:spPr>
+          <a:xfrm>
+            <a:off x="542853" y="1782030"/>
+            <a:ext cx="8173522" cy="3856770"/>
+          </a:xfrm>
+        </p:spPr>
+        <p:txBody>
+          <a:bodyPr>
+            <a:normAutofit fontScale="85000" lnSpcReduction="10000"/>
+          </a:bodyPr>
+          <a:lstStyle/>
+          <a:p>
+            <a:pPr algn="just"/>
+            <a:r>
+              <a:rPr lang="en-US" dirty="0" smtClean="0"/>
+              <a:t>“As </a:t>
+            </a:r>
+            <a:r>
+              <a:rPr lang="en-US" dirty="0"/>
+              <a:t>media choice increases, the likelihood of</a:t>
+            </a:r>
+          </a:p>
+          <a:p>
+            <a:pPr algn="just"/>
+            <a:r>
+              <a:rPr lang="en-US" dirty="0" smtClean="0"/>
+              <a:t>‘chance encounters’ </a:t>
+            </a:r>
+            <a:r>
+              <a:rPr lang="en-US" dirty="0"/>
+              <a:t>(</a:t>
+            </a:r>
+            <a:r>
+              <a:rPr lang="en-US" dirty="0" err="1"/>
+              <a:t>Sunstein</a:t>
+            </a:r>
+            <a:r>
+              <a:rPr lang="en-US" dirty="0"/>
+              <a:t>) with any political content</a:t>
+            </a:r>
+          </a:p>
+          <a:p>
+            <a:pPr algn="just"/>
+            <a:r>
+              <a:rPr lang="en-US" dirty="0"/>
+              <a:t>declines significantly for many people, as this study will</a:t>
+            </a:r>
+          </a:p>
+          <a:p>
+            <a:pPr algn="just"/>
+            <a:r>
+              <a:rPr lang="en-US" dirty="0"/>
+              <a:t>demonstrate. Greater choice allows politically interested</a:t>
+            </a:r>
+          </a:p>
+          <a:p>
+            <a:pPr algn="just"/>
+            <a:r>
+              <a:rPr lang="en-US" dirty="0"/>
+              <a:t>people to access more information and increase </a:t>
+            </a:r>
+            <a:r>
+              <a:rPr lang="en-US" dirty="0" smtClean="0"/>
+              <a:t>their political knowledge</a:t>
+            </a:r>
+            <a:r>
+              <a:rPr lang="en-US" dirty="0"/>
+              <a:t>. Yet those who prefer nonpolitical </a:t>
+            </a:r>
+            <a:r>
+              <a:rPr lang="en-US" dirty="0" smtClean="0"/>
+              <a:t>content can </a:t>
+            </a:r>
+            <a:r>
+              <a:rPr lang="en-US" dirty="0"/>
+              <a:t>more easily escape the </a:t>
+            </a:r>
+            <a:r>
+              <a:rPr lang="en-US" dirty="0" smtClean="0"/>
+              <a:t>news</a:t>
+            </a:r>
+            <a:r>
+              <a:rPr lang="is-IS" dirty="0" smtClean="0"/>
+              <a:t>…”</a:t>
+            </a:r>
+            <a:endParaRPr lang="en-US" dirty="0"/>
+          </a:p>
+        </p:txBody>
+      </p:sp>
     </p:spTree>
+    <p:extLst>
+      <p:ext uri="{BB962C8B-B14F-4D97-AF65-F5344CB8AC3E}">
+        <p14:creationId xmlns:p14="http://schemas.microsoft.com/office/powerpoint/2010/main" val="2153997738"/>
+      </p:ext>
+    </p:extLst>
+  </p:cSld>
+  <p:clrMapOvr>
+    <a:masterClrMapping/>
+  </p:clrMapOvr>
+</p:sld>
+</file>
+
+<file path=ppt/slides/slide9.xml><?xml version="1.0" encoding="utf-8"?>
+<p:sld xmlns:a="http://schemas.openxmlformats.org/drawingml/2006/main" xmlns:r="http://schemas.openxmlformats.org/officeDocument/2006/relationships" xmlns:p="http://schemas.openxmlformats.org/presentationml/2006/main">
+  <p:cSld>
+    <p:spTree>
+      <p:nvGrpSpPr>
+        <p:cNvPr id="1" name=""/>
+        <p:cNvGrpSpPr/>
+        <p:nvPr/>
+      </p:nvGrpSpPr>
+      <p:grpSpPr>
+        <a:xfrm>
+          <a:off x="0" y="0"/>
+          <a:ext cx="0" cy="0"/>
+          <a:chOff x="0" y="0"/>
+          <a:chExt cx="0" cy="0"/>
+        </a:xfrm>
+      </p:grpSpPr>
+      <p:sp>
+        <p:nvSpPr>
+          <p:cNvPr id="2" name="Title 1"/>
+          <p:cNvSpPr>
+            <a:spLocks noGrp="1"/>
+          </p:cNvSpPr>
+          <p:nvPr>
+            <p:ph type="ctrTitle"/>
+          </p:nvPr>
+        </p:nvSpPr>
+        <p:spPr>
+          <a:xfrm>
+            <a:off x="849680" y="481535"/>
+            <a:ext cx="7772400" cy="1470025"/>
+          </a:xfrm>
+        </p:spPr>
+        <p:txBody>
+          <a:bodyPr/>
+          <a:lstStyle/>
+          <a:p>
+            <a:r>
+              <a:rPr lang="en-US" dirty="0" smtClean="0"/>
+              <a:t>Prior conducts surveys tracking a large set of individuals over time.</a:t>
+            </a:r>
+            <a:endParaRPr lang="en-US" dirty="0"/>
+          </a:p>
+        </p:txBody>
+      </p:sp>
+      <p:sp>
+        <p:nvSpPr>
+          <p:cNvPr id="3" name="Subtitle 2"/>
+          <p:cNvSpPr>
+            <a:spLocks noGrp="1"/>
+          </p:cNvSpPr>
+          <p:nvPr>
+            <p:ph type="subTitle" idx="1"/>
+          </p:nvPr>
+        </p:nvSpPr>
+        <p:spPr>
+          <a:xfrm>
+            <a:off x="849680" y="2133599"/>
+            <a:ext cx="7876938" cy="3304665"/>
+          </a:xfrm>
+        </p:spPr>
+        <p:txBody>
+          <a:bodyPr>
+            <a:normAutofit/>
+          </a:bodyPr>
+          <a:lstStyle/>
+          <a:p>
+            <a:pPr marL="457200" indent="-457200" algn="l">
+              <a:buFont typeface="Arial"/>
+              <a:buChar char="•"/>
+            </a:pPr>
+            <a:r>
+              <a:rPr lang="en-US" sz="2400" dirty="0" smtClean="0">
+                <a:solidFill>
+                  <a:schemeClr val="tx1"/>
+                </a:solidFill>
+              </a:rPr>
+              <a:t>Measures media choice (cable/internet access)</a:t>
+            </a:r>
+          </a:p>
+          <a:p>
+            <a:pPr marL="457200" indent="-457200" algn="l">
+              <a:buFont typeface="Arial"/>
+              <a:buChar char="•"/>
+            </a:pPr>
+            <a:r>
+              <a:rPr lang="en-US" sz="2400" dirty="0" smtClean="0">
+                <a:solidFill>
+                  <a:schemeClr val="tx1"/>
+                </a:solidFill>
+              </a:rPr>
+              <a:t>Measures their “relative entertainment preference:”</a:t>
+            </a:r>
+          </a:p>
+          <a:p>
+            <a:pPr marL="914400" lvl="1" indent="-457200" algn="l">
+              <a:buFont typeface="Arial"/>
+              <a:buChar char="•"/>
+            </a:pPr>
+            <a:r>
+              <a:rPr lang="en-US" sz="2400" dirty="0" smtClean="0">
+                <a:solidFill>
+                  <a:schemeClr val="tx1"/>
+                </a:solidFill>
+              </a:rPr>
+              <a:t>entertainment / entertainment + news</a:t>
+            </a:r>
+            <a:endParaRPr lang="en-US" sz="2400" dirty="0">
+              <a:solidFill>
+                <a:schemeClr val="tx1"/>
+              </a:solidFill>
+            </a:endParaRPr>
+          </a:p>
+          <a:p>
+            <a:pPr marL="342900" indent="-342900" algn="l">
+              <a:buFont typeface="Arial"/>
+              <a:buChar char="•"/>
+            </a:pPr>
+            <a:r>
+              <a:rPr lang="en-US" sz="2400" dirty="0">
+                <a:solidFill>
+                  <a:schemeClr val="tx1"/>
+                </a:solidFill>
+              </a:rPr>
+              <a:t>Measures knowledge of politics &amp; turnout</a:t>
+            </a:r>
+          </a:p>
+          <a:p>
+            <a:pPr lvl="1" algn="l"/>
+            <a:endParaRPr lang="en-US" sz="2400" dirty="0" smtClean="0">
+              <a:solidFill>
+                <a:schemeClr val="tx1"/>
+              </a:solidFill>
+            </a:endParaRPr>
+          </a:p>
+          <a:p>
+            <a:pPr lvl="1" algn="l"/>
+            <a:r>
+              <a:rPr lang="en-US" sz="2400" b="1" dirty="0" smtClean="0">
+                <a:solidFill>
+                  <a:schemeClr val="tx1"/>
+                </a:solidFill>
+              </a:rPr>
+              <a:t>Relative entertainment preference shapes the effect of increased media choice on knowledge and participation.</a:t>
+            </a:r>
+          </a:p>
+        </p:txBody>
+      </p:sp>
+    </p:spTree>
+    <p:extLst>
+      <p:ext uri="{BB962C8B-B14F-4D97-AF65-F5344CB8AC3E}">
+        <p14:creationId xmlns:p14="http://schemas.microsoft.com/office/powerpoint/2010/main" val="4031213359"/>
+      </p:ext>
+    </p:extLst>
   </p:cSld>
   <p:clrMapOvr>
     <a:masterClrMapping/>

</xml_diff>